<commit_message>
updates to multiple regressin
</commit_message>
<xml_diff>
--- a/Presentations/ML Multiple Linear Regression.pptx
+++ b/Presentations/ML Multiple Linear Regression.pptx
@@ -296,7 +296,7 @@
             <a:fld id="{1D8BD707-D9CF-40AE-B4C6-C98DA3205C09}" type="datetimeFigureOut">
               <a:rPr lang="en-US" smtClean="0"/>
               <a:pPr/>
-              <a:t>7/13/2017</a:t>
+              <a:t>11/26/2017</a:t>
             </a:fld>
             <a:endParaRPr lang="en-US"/>
           </a:p>
@@ -463,7 +463,7 @@
             <a:fld id="{1D8BD707-D9CF-40AE-B4C6-C98DA3205C09}" type="datetimeFigureOut">
               <a:rPr lang="en-US" smtClean="0"/>
               <a:pPr/>
-              <a:t>7/13/2017</a:t>
+              <a:t>11/26/2017</a:t>
             </a:fld>
             <a:endParaRPr lang="en-US"/>
           </a:p>
@@ -640,7 +640,7 @@
             <a:fld id="{1D8BD707-D9CF-40AE-B4C6-C98DA3205C09}" type="datetimeFigureOut">
               <a:rPr lang="en-US" smtClean="0"/>
               <a:pPr/>
-              <a:t>7/13/2017</a:t>
+              <a:t>11/26/2017</a:t>
             </a:fld>
             <a:endParaRPr lang="en-US"/>
           </a:p>
@@ -807,7 +807,7 @@
             <a:fld id="{1D8BD707-D9CF-40AE-B4C6-C98DA3205C09}" type="datetimeFigureOut">
               <a:rPr lang="en-US" smtClean="0"/>
               <a:pPr/>
-              <a:t>7/13/2017</a:t>
+              <a:t>11/26/2017</a:t>
             </a:fld>
             <a:endParaRPr lang="en-US"/>
           </a:p>
@@ -1050,7 +1050,7 @@
             <a:fld id="{1D8BD707-D9CF-40AE-B4C6-C98DA3205C09}" type="datetimeFigureOut">
               <a:rPr lang="en-US" smtClean="0"/>
               <a:pPr/>
-              <a:t>7/13/2017</a:t>
+              <a:t>11/26/2017</a:t>
             </a:fld>
             <a:endParaRPr lang="en-US"/>
           </a:p>
@@ -1335,7 +1335,7 @@
             <a:fld id="{1D8BD707-D9CF-40AE-B4C6-C98DA3205C09}" type="datetimeFigureOut">
               <a:rPr lang="en-US" smtClean="0"/>
               <a:pPr/>
-              <a:t>7/13/2017</a:t>
+              <a:t>11/26/2017</a:t>
             </a:fld>
             <a:endParaRPr lang="en-US"/>
           </a:p>
@@ -1754,7 +1754,7 @@
             <a:fld id="{1D8BD707-D9CF-40AE-B4C6-C98DA3205C09}" type="datetimeFigureOut">
               <a:rPr lang="en-US" smtClean="0"/>
               <a:pPr/>
-              <a:t>7/13/2017</a:t>
+              <a:t>11/26/2017</a:t>
             </a:fld>
             <a:endParaRPr lang="en-US"/>
           </a:p>
@@ -1869,7 +1869,7 @@
             <a:fld id="{1D8BD707-D9CF-40AE-B4C6-C98DA3205C09}" type="datetimeFigureOut">
               <a:rPr lang="en-US" smtClean="0"/>
               <a:pPr/>
-              <a:t>7/13/2017</a:t>
+              <a:t>11/26/2017</a:t>
             </a:fld>
             <a:endParaRPr lang="en-US"/>
           </a:p>
@@ -1961,7 +1961,7 @@
             <a:fld id="{1D8BD707-D9CF-40AE-B4C6-C98DA3205C09}" type="datetimeFigureOut">
               <a:rPr lang="en-US" smtClean="0"/>
               <a:pPr/>
-              <a:t>7/13/2017</a:t>
+              <a:t>11/26/2017</a:t>
             </a:fld>
             <a:endParaRPr lang="en-US"/>
           </a:p>
@@ -2235,7 +2235,7 @@
             <a:fld id="{1D8BD707-D9CF-40AE-B4C6-C98DA3205C09}" type="datetimeFigureOut">
               <a:rPr lang="en-US" smtClean="0"/>
               <a:pPr/>
-              <a:t>7/13/2017</a:t>
+              <a:t>11/26/2017</a:t>
             </a:fld>
             <a:endParaRPr lang="en-US"/>
           </a:p>
@@ -2485,7 +2485,7 @@
             <a:fld id="{1D8BD707-D9CF-40AE-B4C6-C98DA3205C09}" type="datetimeFigureOut">
               <a:rPr lang="en-US" smtClean="0"/>
               <a:pPr/>
-              <a:t>7/13/2017</a:t>
+              <a:t>11/26/2017</a:t>
             </a:fld>
             <a:endParaRPr lang="en-US"/>
           </a:p>
@@ -2695,7 +2695,7 @@
             <a:fld id="{1D8BD707-D9CF-40AE-B4C6-C98DA3205C09}" type="datetimeFigureOut">
               <a:rPr lang="en-US" smtClean="0"/>
               <a:pPr/>
-              <a:t>7/13/2017</a:t>
+              <a:t>11/26/2017</a:t>
             </a:fld>
             <a:endParaRPr lang="en-US"/>
           </a:p>
@@ -3137,17 +3137,56 @@
                   </a:schemeClr>
                 </a:solidFill>
               </a:rPr>
-              <a:t>Portland Data Science </a:t>
-            </a:r>
-            <a:r>
-              <a:rPr lang="en-US" sz="2400" dirty="0">
+              <a:t>Artificial Intelligence Training</a:t>
+            </a:r>
+            <a:br>
+              <a:rPr lang="en-US" sz="2400" dirty="0" smtClean="0">
                 <a:solidFill>
                   <a:schemeClr val="accent1">
                     <a:lumMod val="75000"/>
                   </a:schemeClr>
                 </a:solidFill>
               </a:rPr>
-              <a:t>Group</a:t>
+            </a:br>
+            <a:r>
+              <a:rPr lang="en-US" sz="2400" dirty="0" smtClean="0">
+                <a:solidFill>
+                  <a:schemeClr val="accent1">
+                    <a:lumMod val="75000"/>
+                  </a:schemeClr>
+                </a:solidFill>
+              </a:rPr>
+              <a:t>Created </a:t>
+            </a:r>
+            <a:r>
+              <a:rPr lang="en-US" sz="2400" dirty="0" smtClean="0">
+                <a:solidFill>
+                  <a:schemeClr val="accent1">
+                    <a:lumMod val="75000"/>
+                  </a:schemeClr>
+                </a:solidFill>
+              </a:rPr>
+              <a:t>by Andrew </a:t>
+            </a:r>
+            <a:r>
+              <a:rPr lang="en-US" sz="2400" dirty="0" err="1" smtClean="0">
+                <a:solidFill>
+                  <a:schemeClr val="accent1">
+                    <a:lumMod val="75000"/>
+                  </a:schemeClr>
+                </a:solidFill>
+              </a:rPr>
+              <a:t>Ferlitsch</a:t>
+            </a:r>
+            <a:r>
+              <a:rPr lang="en-US" sz="2400" dirty="0">
+                <a:solidFill>
+                  <a:schemeClr val="accent1">
+                    <a:lumMod val="75000"/>
+                  </a:schemeClr>
+                </a:solidFill>
+              </a:rPr>
+              <a:t/>
             </a:r>
             <a:br>
               <a:rPr lang="en-US" sz="2400" dirty="0">
@@ -3159,73 +3198,14 @@
               </a:rPr>
             </a:br>
             <a:r>
-              <a:rPr lang="en-US" sz="2400" smtClean="0">
+              <a:rPr lang="en-US" sz="2400" dirty="0" smtClean="0">
                 <a:solidFill>
                   <a:schemeClr val="accent1">
                     <a:lumMod val="75000"/>
                   </a:schemeClr>
                 </a:solidFill>
               </a:rPr>
-              <a:t>Created by Andrew </a:t>
-            </a:r>
-            <a:r>
-              <a:rPr lang="en-US" sz="2400" dirty="0" err="1" smtClean="0">
-                <a:solidFill>
-                  <a:schemeClr val="accent1">
-                    <a:lumMod val="75000"/>
-                  </a:schemeClr>
-                </a:solidFill>
-              </a:rPr>
-              <a:t>Ferlitsch</a:t>
-            </a:r>
-            <a:r>
-              <a:rPr lang="en-US" sz="2400" dirty="0">
-                <a:solidFill>
-                  <a:schemeClr val="accent1">
-                    <a:lumMod val="75000"/>
-                  </a:schemeClr>
-                </a:solidFill>
-              </a:rPr>
-              <a:t/>
-            </a:r>
-            <a:br>
-              <a:rPr lang="en-US" sz="2400" dirty="0">
-                <a:solidFill>
-                  <a:schemeClr val="accent1">
-                    <a:lumMod val="75000"/>
-                  </a:schemeClr>
-                </a:solidFill>
-              </a:rPr>
-            </a:br>
-            <a:r>
-              <a:rPr lang="en-US" sz="2400" dirty="0" smtClean="0">
-                <a:solidFill>
-                  <a:schemeClr val="accent1">
-                    <a:lumMod val="75000"/>
-                  </a:schemeClr>
-                </a:solidFill>
-              </a:rPr>
-              <a:t>Community </a:t>
-            </a:r>
-            <a:r>
-              <a:rPr lang="en-US" sz="2400" dirty="0">
-                <a:solidFill>
-                  <a:schemeClr val="accent1">
-                    <a:lumMod val="75000"/>
-                  </a:schemeClr>
-                </a:solidFill>
-              </a:rPr>
-              <a:t>Outreach </a:t>
-            </a:r>
-            <a:r>
-              <a:rPr lang="en-US" sz="2400" dirty="0" smtClean="0">
-                <a:solidFill>
-                  <a:schemeClr val="accent1">
-                    <a:lumMod val="75000"/>
-                  </a:schemeClr>
-                </a:solidFill>
-              </a:rPr>
-              <a:t>Officer</a:t>
+              <a:t>Instructor</a:t>
             </a:r>
             <a:r>
               <a:rPr lang="en-US" sz="2400" dirty="0" smtClean="0"/>
@@ -9006,7 +8986,7 @@
         <p:spPr>
           <a:xfrm>
             <a:off x="1237058" y="4082912"/>
-            <a:ext cx="3180230" cy="307777"/>
+            <a:ext cx="3666453" cy="307777"/>
           </a:xfrm>
           <a:prstGeom prst="rect">
             <a:avLst/>
@@ -9025,7 +9005,31 @@
                   <a:srgbClr val="00B050"/>
                 </a:solidFill>
               </a:rPr>
-              <a:t>Eliminate x2 (2), where 0 is x0 (constant) </a:t>
+              <a:t>Eliminate </a:t>
+            </a:r>
+            <a:r>
+              <a:rPr lang="en-US" sz="1400" smtClean="0">
+                <a:solidFill>
+                  <a:srgbClr val="00B050"/>
+                </a:solidFill>
+              </a:rPr>
+              <a:t>x2 </a:t>
+            </a:r>
+            <a:r>
+              <a:rPr lang="en-US" sz="1400" smtClean="0">
+                <a:solidFill>
+                  <a:srgbClr val="00B050"/>
+                </a:solidFill>
+              </a:rPr>
+              <a:t>(index=2</a:t>
+            </a:r>
+            <a:r>
+              <a:rPr lang="en-US" sz="1400" dirty="0" smtClean="0">
+                <a:solidFill>
+                  <a:srgbClr val="00B050"/>
+                </a:solidFill>
+              </a:rPr>
+              <a:t>), where 0 is x0 (constant) </a:t>
             </a:r>
             <a:endParaRPr lang="en-US" sz="1400" dirty="0">
               <a:solidFill>

</xml_diff>